<commit_message>
Section Simulation is added
</commit_message>
<xml_diff>
--- a/papers/Case2016/pictures/Drawings 2.pptx
+++ b/papers/Case2016/pictures/Drawings 2.pptx
@@ -5,10 +5,11 @@
     <p:sldMasterId id="2147483648" r:id="rId1"/>
   </p:sldMasterIdLst>
   <p:notesMasterIdLst>
-    <p:notesMasterId r:id="rId3"/>
+    <p:notesMasterId r:id="rId4"/>
   </p:notesMasterIdLst>
   <p:sldIdLst>
     <p:sldId id="256" r:id="rId2"/>
+    <p:sldId id="257" r:id="rId3"/>
   </p:sldIdLst>
   <p:sldSz cx="9144000" cy="6858000" type="screen4x3"/>
   <p:notesSz cx="6858000" cy="9144000"/>
@@ -192,7 +193,7 @@
           <a:p>
             <a:fld id="{958045ED-4F2E-F044-83D4-6DC8B433F70B}" type="datetimeFigureOut">
               <a:rPr lang="en-US" smtClean="0"/>
-              <a:t>2/24/16</a:t>
+              <a:t>2/28/16</a:t>
             </a:fld>
             <a:endParaRPr lang="en-US"/>
           </a:p>
@@ -729,7 +730,7 @@
           <a:p>
             <a:fld id="{E4DEABBC-2339-6548-ACD8-7194C722D424}" type="datetimeFigureOut">
               <a:rPr lang="en-US" smtClean="0"/>
-              <a:t>2/17/16</a:t>
+              <a:t>2/28/16</a:t>
             </a:fld>
             <a:endParaRPr lang="en-US"/>
           </a:p>
@@ -899,7 +900,7 @@
           <a:p>
             <a:fld id="{E4DEABBC-2339-6548-ACD8-7194C722D424}" type="datetimeFigureOut">
               <a:rPr lang="en-US" smtClean="0"/>
-              <a:t>2/17/16</a:t>
+              <a:t>2/28/16</a:t>
             </a:fld>
             <a:endParaRPr lang="en-US"/>
           </a:p>
@@ -1079,7 +1080,7 @@
           <a:p>
             <a:fld id="{E4DEABBC-2339-6548-ACD8-7194C722D424}" type="datetimeFigureOut">
               <a:rPr lang="en-US" smtClean="0"/>
-              <a:t>2/17/16</a:t>
+              <a:t>2/28/16</a:t>
             </a:fld>
             <a:endParaRPr lang="en-US"/>
           </a:p>
@@ -1249,7 +1250,7 @@
           <a:p>
             <a:fld id="{E4DEABBC-2339-6548-ACD8-7194C722D424}" type="datetimeFigureOut">
               <a:rPr lang="en-US" smtClean="0"/>
-              <a:t>2/17/16</a:t>
+              <a:t>2/28/16</a:t>
             </a:fld>
             <a:endParaRPr lang="en-US"/>
           </a:p>
@@ -1495,7 +1496,7 @@
           <a:p>
             <a:fld id="{E4DEABBC-2339-6548-ACD8-7194C722D424}" type="datetimeFigureOut">
               <a:rPr lang="en-US" smtClean="0"/>
-              <a:t>2/17/16</a:t>
+              <a:t>2/28/16</a:t>
             </a:fld>
             <a:endParaRPr lang="en-US"/>
           </a:p>
@@ -1783,7 +1784,7 @@
           <a:p>
             <a:fld id="{E4DEABBC-2339-6548-ACD8-7194C722D424}" type="datetimeFigureOut">
               <a:rPr lang="en-US" smtClean="0"/>
-              <a:t>2/17/16</a:t>
+              <a:t>2/28/16</a:t>
             </a:fld>
             <a:endParaRPr lang="en-US"/>
           </a:p>
@@ -2205,7 +2206,7 @@
           <a:p>
             <a:fld id="{E4DEABBC-2339-6548-ACD8-7194C722D424}" type="datetimeFigureOut">
               <a:rPr lang="en-US" smtClean="0"/>
-              <a:t>2/17/16</a:t>
+              <a:t>2/28/16</a:t>
             </a:fld>
             <a:endParaRPr lang="en-US"/>
           </a:p>
@@ -2323,7 +2324,7 @@
           <a:p>
             <a:fld id="{E4DEABBC-2339-6548-ACD8-7194C722D424}" type="datetimeFigureOut">
               <a:rPr lang="en-US" smtClean="0"/>
-              <a:t>2/17/16</a:t>
+              <a:t>2/28/16</a:t>
             </a:fld>
             <a:endParaRPr lang="en-US"/>
           </a:p>
@@ -2418,7 +2419,7 @@
           <a:p>
             <a:fld id="{E4DEABBC-2339-6548-ACD8-7194C722D424}" type="datetimeFigureOut">
               <a:rPr lang="en-US" smtClean="0"/>
-              <a:t>2/17/16</a:t>
+              <a:t>2/28/16</a:t>
             </a:fld>
             <a:endParaRPr lang="en-US"/>
           </a:p>
@@ -2695,7 +2696,7 @@
           <a:p>
             <a:fld id="{E4DEABBC-2339-6548-ACD8-7194C722D424}" type="datetimeFigureOut">
               <a:rPr lang="en-US" smtClean="0"/>
-              <a:t>2/17/16</a:t>
+              <a:t>2/28/16</a:t>
             </a:fld>
             <a:endParaRPr lang="en-US"/>
           </a:p>
@@ -2948,7 +2949,7 @@
           <a:p>
             <a:fld id="{E4DEABBC-2339-6548-ACD8-7194C722D424}" type="datetimeFigureOut">
               <a:rPr lang="en-US" smtClean="0"/>
-              <a:t>2/17/16</a:t>
+              <a:t>2/28/16</a:t>
             </a:fld>
             <a:endParaRPr lang="en-US"/>
           </a:p>
@@ -3161,7 +3162,7 @@
           <a:p>
             <a:fld id="{E4DEABBC-2339-6548-ACD8-7194C722D424}" type="datetimeFigureOut">
               <a:rPr lang="en-US" smtClean="0"/>
-              <a:t>2/17/16</a:t>
+              <a:t>2/28/16</a:t>
             </a:fld>
             <a:endParaRPr lang="en-US"/>
           </a:p>
@@ -3558,7 +3559,7 @@
         </p:blipFill>
         <p:spPr>
           <a:xfrm>
-            <a:off x="240632" y="0"/>
+            <a:off x="197576" y="0"/>
             <a:ext cx="8903368" cy="6858000"/>
           </a:xfrm>
           <a:prstGeom prst="rect">
@@ -3574,7 +3575,7 @@
         </p:nvSpPr>
         <p:spPr>
           <a:xfrm>
-            <a:off x="4454708" y="1763078"/>
+            <a:off x="4411652" y="1763078"/>
             <a:ext cx="246432" cy="5100655"/>
           </a:xfrm>
           <a:prstGeom prst="rect">
@@ -3632,7 +3633,7 @@
         </p:nvSpPr>
         <p:spPr>
           <a:xfrm>
-            <a:off x="663467" y="1213303"/>
+            <a:off x="620411" y="1213303"/>
             <a:ext cx="2786563" cy="1611416"/>
           </a:xfrm>
           <a:prstGeom prst="rect">
@@ -3712,7 +3713,7 @@
         </p:blipFill>
         <p:spPr>
           <a:xfrm>
-            <a:off x="3066707" y="1542580"/>
+            <a:off x="3023651" y="1542580"/>
             <a:ext cx="247650" cy="279400"/>
           </a:xfrm>
           <a:prstGeom prst="rect">
@@ -3728,7 +3729,7 @@
         </p:nvSpPr>
         <p:spPr>
           <a:xfrm>
-            <a:off x="2726715" y="2009531"/>
+            <a:off x="2683659" y="2009531"/>
             <a:ext cx="587642" cy="189579"/>
           </a:xfrm>
           <a:prstGeom prst="rect">
@@ -3774,7 +3775,7 @@
         </p:nvSpPr>
         <p:spPr>
           <a:xfrm>
-            <a:off x="2726715" y="2351511"/>
+            <a:off x="2683659" y="2351511"/>
             <a:ext cx="587642" cy="189579"/>
           </a:xfrm>
           <a:prstGeom prst="rect">
@@ -3812,10 +3813,132 @@
           </a:p>
         </p:txBody>
       </p:sp>
+      <p:sp>
+        <p:nvSpPr>
+          <p:cNvPr id="2" name="Rectangle 1"/>
+          <p:cNvSpPr/>
+          <p:nvPr/>
+        </p:nvSpPr>
+        <p:spPr>
+          <a:xfrm>
+            <a:off x="332045" y="313765"/>
+            <a:ext cx="8602777" cy="6439648"/>
+          </a:xfrm>
+          <a:prstGeom prst="rect">
+            <a:avLst/>
+          </a:prstGeom>
+          <a:noFill/>
+          <a:ln w="152400" cmpd="sng">
+            <a:solidFill>
+              <a:srgbClr val="F9017A"/>
+            </a:solidFill>
+          </a:ln>
+        </p:spPr>
+        <p:style>
+          <a:lnRef idx="1">
+            <a:schemeClr val="accent1"/>
+          </a:lnRef>
+          <a:fillRef idx="3">
+            <a:schemeClr val="accent1"/>
+          </a:fillRef>
+          <a:effectRef idx="2">
+            <a:schemeClr val="accent1"/>
+          </a:effectRef>
+          <a:fontRef idx="minor">
+            <a:schemeClr val="lt1"/>
+          </a:fontRef>
+        </p:style>
+        <p:txBody>
+          <a:bodyPr rtlCol="0" anchor="ctr"/>
+          <a:lstStyle/>
+          <a:p>
+            <a:pPr algn="ctr"/>
+            <a:endParaRPr lang="en-US"/>
+          </a:p>
+        </p:txBody>
+      </p:sp>
+      <p:sp>
+        <p:nvSpPr>
+          <p:cNvPr id="3" name="Oval 2"/>
+          <p:cNvSpPr/>
+          <p:nvPr/>
+        </p:nvSpPr>
+        <p:spPr>
+          <a:xfrm>
+            <a:off x="4411652" y="6603086"/>
+            <a:ext cx="246432" cy="271737"/>
+          </a:xfrm>
+          <a:prstGeom prst="ellipse">
+            <a:avLst/>
+          </a:prstGeom>
+          <a:solidFill>
+            <a:srgbClr val="FF0000"/>
+          </a:solidFill>
+        </p:spPr>
+        <p:style>
+          <a:lnRef idx="1">
+            <a:schemeClr val="accent1"/>
+          </a:lnRef>
+          <a:fillRef idx="3">
+            <a:schemeClr val="accent1"/>
+          </a:fillRef>
+          <a:effectRef idx="2">
+            <a:schemeClr val="accent1"/>
+          </a:effectRef>
+          <a:fontRef idx="minor">
+            <a:schemeClr val="lt1"/>
+          </a:fontRef>
+        </p:style>
+        <p:txBody>
+          <a:bodyPr rtlCol="0" anchor="ctr"/>
+          <a:lstStyle/>
+          <a:p>
+            <a:pPr algn="ctr"/>
+            <a:endParaRPr lang="en-US"/>
+          </a:p>
+        </p:txBody>
+      </p:sp>
     </p:spTree>
     <p:extLst>
       <p:ext uri="{BB962C8B-B14F-4D97-AF65-F5344CB8AC3E}">
         <p14:creationId xmlns:p14="http://schemas.microsoft.com/office/powerpoint/2010/main" val="3216237592"/>
+      </p:ext>
+    </p:extLst>
+  </p:cSld>
+  <p:clrMapOvr>
+    <a:masterClrMapping/>
+  </p:clrMapOvr>
+  <p:timing>
+    <p:tnLst>
+      <p:par>
+        <p:cTn xmlns:p14="http://schemas.microsoft.com/office/powerpoint/2010/main" id="1" dur="indefinite" restart="never" nodeType="tmRoot"/>
+      </p:par>
+    </p:tnLst>
+  </p:timing>
+</p:sld>
+</file>
+
+<file path=ppt/slides/slide2.xml><?xml version="1.0" encoding="utf-8"?>
+<p:sld xmlns:a="http://schemas.openxmlformats.org/drawingml/2006/main" xmlns:r="http://schemas.openxmlformats.org/officeDocument/2006/relationships" xmlns:p="http://schemas.openxmlformats.org/presentationml/2006/main">
+  <p:cSld>
+    <p:spTree>
+      <p:nvGrpSpPr>
+        <p:cNvPr id="1" name=""/>
+        <p:cNvGrpSpPr/>
+        <p:nvPr/>
+      </p:nvGrpSpPr>
+      <p:grpSpPr>
+        <a:xfrm>
+          <a:off x="0" y="0"/>
+          <a:ext cx="0" cy="0"/>
+          <a:chOff x="0" y="0"/>
+          <a:chExt cx="0" cy="0"/>
+        </a:xfrm>
+      </p:grpSpPr>
+    </p:spTree>
+    <p:extLst>
+      <p:ext uri="{BB962C8B-B14F-4D97-AF65-F5344CB8AC3E}">
+        <p14:creationId xmlns:p14="http://schemas.microsoft.com/office/powerpoint/2010/main" val="2690021900"/>
       </p:ext>
     </p:extLst>
   </p:cSld>

</xml_diff>